<commit_message>
Added page on MosFet
Added Mosfet device as a relay replacement
</commit_message>
<xml_diff>
--- a/Arduino IO Compendium R2.pptx
+++ b/Arduino IO Compendium R2.pptx
@@ -267,7 +267,7 @@
           <a:p>
             <a:fld id="{12054D22-7DC6-4818-8DE5-E280DFD5FB49}" type="datetimeFigureOut">
               <a:rPr lang="en-US" smtClean="0"/>
-              <a:t>12/15/2022</a:t>
+              <a:t>1/10/2023</a:t>
             </a:fld>
             <a:endParaRPr lang="en-US"/>
           </a:p>
@@ -3967,7 +3967,7 @@
           <a:p>
             <a:fld id="{12D35354-3C70-45FE-A7BC-FEBCE88C825A}" type="datetime8">
               <a:rPr lang="en-US" smtClean="0"/>
-              <a:t>12/15/2022 3:11 PM</a:t>
+              <a:t>1/10/2023 5:23 PM</a:t>
             </a:fld>
             <a:endParaRPr lang="en-US"/>
           </a:p>
@@ -4165,7 +4165,7 @@
           <a:p>
             <a:fld id="{DE273977-2B4E-4BD8-8226-CAEE823F3008}" type="datetime8">
               <a:rPr lang="en-US" smtClean="0"/>
-              <a:t>12/15/2022 3:11 PM</a:t>
+              <a:t>1/10/2023 5:23 PM</a:t>
             </a:fld>
             <a:endParaRPr lang="en-US"/>
           </a:p>
@@ -4373,7 +4373,7 @@
           <a:p>
             <a:fld id="{7E2DC526-9E9D-4998-8C50-0541226B08CF}" type="datetime8">
               <a:rPr lang="en-US" smtClean="0"/>
-              <a:t>12/15/2022 3:11 PM</a:t>
+              <a:t>1/10/2023 5:23 PM</a:t>
             </a:fld>
             <a:endParaRPr lang="en-US"/>
           </a:p>
@@ -4571,7 +4571,7 @@
           <a:p>
             <a:fld id="{956EF2D3-783C-4E62-879C-6E42AA097112}" type="datetime8">
               <a:rPr lang="en-US" smtClean="0"/>
-              <a:t>12/15/2022 3:11 PM</a:t>
+              <a:t>1/10/2023 5:23 PM</a:t>
             </a:fld>
             <a:endParaRPr lang="en-US"/>
           </a:p>
@@ -4846,7 +4846,7 @@
           <a:p>
             <a:fld id="{CEEB4330-8AFB-48E3-B890-210D056A958B}" type="datetime8">
               <a:rPr lang="en-US" smtClean="0"/>
-              <a:t>12/15/2022 3:11 PM</a:t>
+              <a:t>1/10/2023 5:23 PM</a:t>
             </a:fld>
             <a:endParaRPr lang="en-US"/>
           </a:p>
@@ -5111,7 +5111,7 @@
           <a:p>
             <a:fld id="{66E23911-0252-40BE-BBB8-760394743E26}" type="datetime8">
               <a:rPr lang="en-US" smtClean="0"/>
-              <a:t>12/15/2022 3:11 PM</a:t>
+              <a:t>1/10/2023 5:23 PM</a:t>
             </a:fld>
             <a:endParaRPr lang="en-US"/>
           </a:p>
@@ -5523,7 +5523,7 @@
           <a:p>
             <a:fld id="{BBB6AC5D-77FB-46F6-9132-21FF30B4912F}" type="datetime8">
               <a:rPr lang="en-US" smtClean="0"/>
-              <a:t>12/15/2022 3:11 PM</a:t>
+              <a:t>1/10/2023 5:23 PM</a:t>
             </a:fld>
             <a:endParaRPr lang="en-US"/>
           </a:p>
@@ -5664,7 +5664,7 @@
           <a:p>
             <a:fld id="{6017FBC6-3D6B-4CF2-A705-4BC9E7D4582C}" type="datetime8">
               <a:rPr lang="en-US" smtClean="0"/>
-              <a:t>12/15/2022 3:11 PM</a:t>
+              <a:t>1/10/2023 5:23 PM</a:t>
             </a:fld>
             <a:endParaRPr lang="en-US"/>
           </a:p>
@@ -6045,7 +6045,7 @@
           <a:p>
             <a:fld id="{0D1B1BD9-FAAE-42CF-9C1C-24872CEE05A7}" type="datetime8">
               <a:rPr lang="en-US" smtClean="0"/>
-              <a:t>12/15/2022 3:11 PM</a:t>
+              <a:t>1/10/2023 5:23 PM</a:t>
             </a:fld>
             <a:endParaRPr lang="en-US"/>
           </a:p>
@@ -6333,7 +6333,7 @@
           <a:p>
             <a:fld id="{63B48E98-414D-4169-A026-380BA4A7A23F}" type="datetime8">
               <a:rPr lang="en-US" smtClean="0"/>
-              <a:t>12/15/2022 3:11 PM</a:t>
+              <a:t>1/10/2023 5:23 PM</a:t>
             </a:fld>
             <a:endParaRPr lang="en-US"/>
           </a:p>
@@ -6574,7 +6574,7 @@
           <a:p>
             <a:fld id="{9D52C73E-D6AD-4984-9C4A-C03CB437FD89}" type="datetime8">
               <a:rPr lang="en-US" smtClean="0"/>
-              <a:t>12/15/2022 3:11 PM</a:t>
+              <a:t>1/10/2023 5:23 PM</a:t>
             </a:fld>
             <a:endParaRPr lang="en-US"/>
           </a:p>
@@ -20389,8 +20389,8 @@
           <a:chExt cx="0" cy="0"/>
         </a:xfrm>
       </p:grpSpPr>
-      <mc:AlternateContent xmlns:mc="http://schemas.openxmlformats.org/markup-compatibility/2006">
-        <mc:Choice xmlns:we="http://schemas.microsoft.com/office/webextensions/webextension/2010/11" xmlns:pca="http://schemas.microsoft.com/office/powerpoint/2013/contentapp" Requires="we pca">
+      <mc:AlternateContent xmlns:mc="http://schemas.openxmlformats.org/markup-compatibility/2006" xmlns:we="http://schemas.microsoft.com/office/webextensions/webextension/2010/11" xmlns:pca="http://schemas.microsoft.com/office/powerpoint/2013/contentapp">
+        <mc:Choice Requires="we pca">
           <p:graphicFrame>
             <p:nvGraphicFramePr>
               <p:cNvPr id="4" name="Add-in 3" title="EasyTimer">
@@ -20422,7 +20422,7 @@
             </a:graphic>
           </p:graphicFrame>
         </mc:Choice>
-        <mc:Fallback>
+        <mc:Fallback xmlns="">
           <p:pic>
             <p:nvPicPr>
               <p:cNvPr id="4" name="Add-in 3" title="EasyTimer">
@@ -22514,7 +22514,1010 @@
           <p:nvPr>
             <p:extLst>
               <p:ext uri="{D42A27DB-BD31-4B8C-83A1-F6EECF244321}">
-                <p14:modId xmlns:p14="http://schemas.microsoft.com/office/powerpoint/2010/main" val="70845470"/>
+                <p14:modId xmlns:p14="http://schemas.microsoft.com/office/powerpoint/2010/main" val="890537572"/>
+              </p:ext>
+            </p:extLst>
+          </p:nvPr>
+        </p:nvGraphicFramePr>
+        <p:xfrm>
+          <a:off x="415505" y="391004"/>
+          <a:ext cx="11360989" cy="6287164"/>
+        </p:xfrm>
+        <a:graphic>
+          <a:graphicData uri="http://schemas.openxmlformats.org/drawingml/2006/table">
+            <a:tbl>
+              <a:tblPr firstRow="1" bandRow="1">
+                <a:tableStyleId>{5C22544A-7EE6-4342-B048-85BDC9FD1C3A}</a:tableStyleId>
+              </a:tblPr>
+              <a:tblGrid>
+                <a:gridCol w="1130060">
+                  <a:extLst>
+                    <a:ext uri="{9D8B030D-6E8A-4147-A177-3AD203B41FA5}">
+                      <a16:colId xmlns:a16="http://schemas.microsoft.com/office/drawing/2014/main" val="747525499"/>
+                    </a:ext>
+                  </a:extLst>
+                </a:gridCol>
+                <a:gridCol w="4466567">
+                  <a:extLst>
+                    <a:ext uri="{9D8B030D-6E8A-4147-A177-3AD203B41FA5}">
+                      <a16:colId xmlns:a16="http://schemas.microsoft.com/office/drawing/2014/main" val="2892156475"/>
+                    </a:ext>
+                  </a:extLst>
+                </a:gridCol>
+                <a:gridCol w="5764362">
+                  <a:extLst>
+                    <a:ext uri="{9D8B030D-6E8A-4147-A177-3AD203B41FA5}">
+                      <a16:colId xmlns:a16="http://schemas.microsoft.com/office/drawing/2014/main" val="3449804923"/>
+                    </a:ext>
+                  </a:extLst>
+                </a:gridCol>
+              </a:tblGrid>
+              <a:tr h="919355">
+                <a:tc>
+                  <a:txBody>
+                    <a:bodyPr/>
+                    <a:lstStyle/>
+                    <a:p>
+                      <a:r>
+                        <a:rPr lang="en-US" sz="4400" dirty="0"/>
+                        <a:t>11b</a:t>
+                      </a:r>
+                    </a:p>
+                  </a:txBody>
+                  <a:tcPr/>
+                </a:tc>
+                <a:tc>
+                  <a:txBody>
+                    <a:bodyPr/>
+                    <a:lstStyle/>
+                    <a:p>
+                      <a:r>
+                        <a:rPr lang="en-US" sz="4400" dirty="0">
+                          <a:solidFill>
+                            <a:srgbClr val="FFFF00"/>
+                          </a:solidFill>
+                        </a:rPr>
+                        <a:t>MOSFET</a:t>
+                      </a:r>
+                    </a:p>
+                  </a:txBody>
+                  <a:tcPr/>
+                </a:tc>
+                <a:tc>
+                  <a:txBody>
+                    <a:bodyPr/>
+                    <a:lstStyle/>
+                    <a:p>
+                      <a:pPr marL="0" marR="0" lvl="0" indent="0" algn="l" defTabSz="914400" rtl="0" eaLnBrk="1" fontAlgn="auto" latinLnBrk="0" hangingPunct="1">
+                        <a:lnSpc>
+                          <a:spcPct val="100000"/>
+                        </a:lnSpc>
+                        <a:spcBef>
+                          <a:spcPts val="0"/>
+                        </a:spcBef>
+                        <a:spcAft>
+                          <a:spcPts val="0"/>
+                        </a:spcAft>
+                        <a:buClrTx/>
+                        <a:buSzTx/>
+                        <a:buFontTx/>
+                        <a:buNone/>
+                        <a:tabLst/>
+                        <a:defRPr/>
+                      </a:pPr>
+                      <a:r>
+                        <a:rPr lang="en-US" sz="4400" b="1" kern="1200" dirty="0">
+                          <a:solidFill>
+                            <a:schemeClr val="lt1"/>
+                          </a:solidFill>
+                          <a:latin typeface="+mn-lt"/>
+                          <a:ea typeface="+mn-ea"/>
+                          <a:cs typeface="+mn-cs"/>
+                        </a:rPr>
+                        <a:t>Electronic Switch</a:t>
+                      </a:r>
+                    </a:p>
+                  </a:txBody>
+                  <a:tcPr/>
+                </a:tc>
+                <a:extLst>
+                  <a:ext uri="{0D108BD9-81ED-4DB2-BD59-A6C34878D82A}">
+                    <a16:rowId xmlns:a16="http://schemas.microsoft.com/office/drawing/2014/main" val="4166713368"/>
+                  </a:ext>
+                </a:extLst>
+              </a:tr>
+              <a:tr h="1405409">
+                <a:tc gridSpan="2">
+                  <a:txBody>
+                    <a:bodyPr/>
+                    <a:lstStyle/>
+                    <a:p>
+                      <a:r>
+                        <a:rPr lang="en-US" b="1" dirty="0"/>
+                        <a:t>Usage:</a:t>
+                      </a:r>
+                    </a:p>
+                    <a:p>
+                      <a:r>
+                        <a:rPr lang="en-US" dirty="0"/>
+                        <a:t>Low power output from Arduino Pin can control a higher power electrical circuit. It is essentially a relay replacement. </a:t>
+                      </a:r>
+                    </a:p>
+                  </a:txBody>
+                  <a:tcPr/>
+                </a:tc>
+                <a:tc hMerge="1">
+                  <a:txBody>
+                    <a:bodyPr/>
+                    <a:lstStyle/>
+                    <a:p>
+                      <a:endParaRPr lang="en-US"/>
+                    </a:p>
+                  </a:txBody>
+                  <a:tcPr/>
+                </a:tc>
+                <a:tc>
+                  <a:txBody>
+                    <a:bodyPr/>
+                    <a:lstStyle/>
+                    <a:p>
+                      <a:r>
+                        <a:rPr lang="en-US" b="1" dirty="0"/>
+                        <a:t>Photo:</a:t>
+                      </a:r>
+                    </a:p>
+                    <a:p>
+                      <a:endParaRPr lang="en-US" dirty="0"/>
+                    </a:p>
+                  </a:txBody>
+                  <a:tcPr/>
+                </a:tc>
+                <a:extLst>
+                  <a:ext uri="{0D108BD9-81ED-4DB2-BD59-A6C34878D82A}">
+                    <a16:rowId xmlns:a16="http://schemas.microsoft.com/office/drawing/2014/main" val="1083252038"/>
+                  </a:ext>
+                </a:extLst>
+              </a:tr>
+              <a:tr h="1525957">
+                <a:tc gridSpan="2">
+                  <a:txBody>
+                    <a:bodyPr/>
+                    <a:lstStyle/>
+                    <a:p>
+                      <a:pPr marL="0" marR="0" lvl="0" indent="0" algn="l" defTabSz="914400" rtl="0" eaLnBrk="1" fontAlgn="auto" latinLnBrk="0" hangingPunct="1">
+                        <a:lnSpc>
+                          <a:spcPct val="100000"/>
+                        </a:lnSpc>
+                        <a:spcBef>
+                          <a:spcPts val="0"/>
+                        </a:spcBef>
+                        <a:spcAft>
+                          <a:spcPts val="0"/>
+                        </a:spcAft>
+                        <a:buClrTx/>
+                        <a:buSzTx/>
+                        <a:buFontTx/>
+                        <a:buNone/>
+                        <a:tabLst/>
+                        <a:defRPr/>
+                      </a:pPr>
+                      <a:r>
+                        <a:rPr lang="en-US" b="1" dirty="0"/>
+                        <a:t>How it Works:</a:t>
+                      </a:r>
+                    </a:p>
+                    <a:p>
+                      <a:pPr marL="0" marR="0" lvl="0" indent="0" algn="l" defTabSz="914400" rtl="0" eaLnBrk="1" fontAlgn="auto" latinLnBrk="0" hangingPunct="1">
+                        <a:lnSpc>
+                          <a:spcPct val="100000"/>
+                        </a:lnSpc>
+                        <a:spcBef>
+                          <a:spcPts val="0"/>
+                        </a:spcBef>
+                        <a:spcAft>
+                          <a:spcPts val="0"/>
+                        </a:spcAft>
+                        <a:buClrTx/>
+                        <a:buSzTx/>
+                        <a:buFontTx/>
+                        <a:buNone/>
+                        <a:tabLst/>
+                        <a:defRPr/>
+                      </a:pPr>
+                      <a:r>
+                        <a:rPr lang="en-US" dirty="0"/>
+                        <a:t>A low power digital </a:t>
+                      </a:r>
+                      <a:r>
+                        <a:rPr lang="en-US" b="1" dirty="0"/>
+                        <a:t>voltage</a:t>
+                      </a:r>
+                      <a:r>
+                        <a:rPr lang="en-US" dirty="0"/>
+                        <a:t> signal is applied to the gate of the device. This allows a higher current to flow from the source to the drain.</a:t>
+                      </a:r>
+                    </a:p>
+                  </a:txBody>
+                  <a:tcPr/>
+                </a:tc>
+                <a:tc hMerge="1">
+                  <a:txBody>
+                    <a:bodyPr/>
+                    <a:lstStyle/>
+                    <a:p>
+                      <a:endParaRPr lang="en-US"/>
+                    </a:p>
+                  </a:txBody>
+                  <a:tcPr/>
+                </a:tc>
+                <a:tc>
+                  <a:txBody>
+                    <a:bodyPr/>
+                    <a:lstStyle/>
+                    <a:p>
+                      <a:pPr marL="0" marR="0" lvl="0" indent="0" algn="l" defTabSz="914400" rtl="0" eaLnBrk="1" fontAlgn="auto" latinLnBrk="0" hangingPunct="1">
+                        <a:lnSpc>
+                          <a:spcPct val="100000"/>
+                        </a:lnSpc>
+                        <a:spcBef>
+                          <a:spcPts val="0"/>
+                        </a:spcBef>
+                        <a:spcAft>
+                          <a:spcPts val="0"/>
+                        </a:spcAft>
+                        <a:buClrTx/>
+                        <a:buSzTx/>
+                        <a:buFontTx/>
+                        <a:buNone/>
+                        <a:tabLst/>
+                        <a:defRPr/>
+                      </a:pPr>
+                      <a:r>
+                        <a:rPr lang="en-US" b="1" dirty="0"/>
+                        <a:t>Pros:</a:t>
+                      </a:r>
+                    </a:p>
+                    <a:p>
+                      <a:pPr marL="285750" marR="0" lvl="0" indent="-285750" algn="l" defTabSz="914400" rtl="0" eaLnBrk="1" fontAlgn="auto" latinLnBrk="0" hangingPunct="1">
+                        <a:lnSpc>
+                          <a:spcPct val="100000"/>
+                        </a:lnSpc>
+                        <a:spcBef>
+                          <a:spcPts val="0"/>
+                        </a:spcBef>
+                        <a:spcAft>
+                          <a:spcPts val="0"/>
+                        </a:spcAft>
+                        <a:buClrTx/>
+                        <a:buSzTx/>
+                        <a:buFont typeface="Arial" panose="020B0604020202020204" pitchFamily="34" charset="0"/>
+                        <a:buChar char="•"/>
+                        <a:tabLst/>
+                        <a:defRPr/>
+                      </a:pPr>
+                      <a:r>
+                        <a:rPr lang="en-US" dirty="0"/>
+                        <a:t>Inexpensive</a:t>
+                      </a:r>
+                    </a:p>
+                    <a:p>
+                      <a:pPr marL="285750" marR="0" lvl="0" indent="-285750" algn="l" defTabSz="914400" rtl="0" eaLnBrk="1" fontAlgn="auto" latinLnBrk="0" hangingPunct="1">
+                        <a:lnSpc>
+                          <a:spcPct val="100000"/>
+                        </a:lnSpc>
+                        <a:spcBef>
+                          <a:spcPts val="0"/>
+                        </a:spcBef>
+                        <a:spcAft>
+                          <a:spcPts val="0"/>
+                        </a:spcAft>
+                        <a:buClrTx/>
+                        <a:buSzTx/>
+                        <a:buFont typeface="Arial" panose="020B0604020202020204" pitchFamily="34" charset="0"/>
+                        <a:buChar char="•"/>
+                        <a:tabLst/>
+                        <a:defRPr/>
+                      </a:pPr>
+                      <a:r>
+                        <a:rPr lang="en-US" dirty="0"/>
+                        <a:t>Allows switching electrical loads beyond the rating of an Arduino alone. </a:t>
+                      </a:r>
+                    </a:p>
+                    <a:p>
+                      <a:pPr marL="0" marR="0" lvl="0" indent="0" algn="l" defTabSz="914400" rtl="0" eaLnBrk="1" fontAlgn="auto" latinLnBrk="0" hangingPunct="1">
+                        <a:lnSpc>
+                          <a:spcPct val="100000"/>
+                        </a:lnSpc>
+                        <a:spcBef>
+                          <a:spcPts val="0"/>
+                        </a:spcBef>
+                        <a:spcAft>
+                          <a:spcPts val="0"/>
+                        </a:spcAft>
+                        <a:buClrTx/>
+                        <a:buSzTx/>
+                        <a:buFont typeface="Arial" panose="020B0604020202020204" pitchFamily="34" charset="0"/>
+                        <a:buNone/>
+                        <a:tabLst/>
+                        <a:defRPr/>
+                      </a:pPr>
+                      <a:r>
+                        <a:rPr lang="en-US" dirty="0"/>
+                        <a:t>Cons:</a:t>
+                      </a:r>
+                    </a:p>
+                    <a:p>
+                      <a:pPr marL="285750" marR="0" lvl="0" indent="-285750" algn="l" defTabSz="914400" rtl="0" eaLnBrk="1" fontAlgn="auto" latinLnBrk="0" hangingPunct="1">
+                        <a:lnSpc>
+                          <a:spcPct val="100000"/>
+                        </a:lnSpc>
+                        <a:spcBef>
+                          <a:spcPts val="0"/>
+                        </a:spcBef>
+                        <a:spcAft>
+                          <a:spcPts val="0"/>
+                        </a:spcAft>
+                        <a:buClrTx/>
+                        <a:buSzTx/>
+                        <a:buFont typeface="Arial" panose="020B0604020202020204" pitchFamily="34" charset="0"/>
+                        <a:buChar char="•"/>
+                        <a:tabLst/>
+                        <a:defRPr/>
+                      </a:pPr>
+                      <a:r>
+                        <a:rPr lang="en-US" dirty="0"/>
+                        <a:t>Not all devices are rated for logic level switching voltage</a:t>
+                      </a:r>
+                    </a:p>
+                    <a:p>
+                      <a:pPr marL="285750" marR="0" lvl="0" indent="-285750" algn="l" defTabSz="914400" rtl="0" eaLnBrk="1" fontAlgn="auto" latinLnBrk="0" hangingPunct="1">
+                        <a:lnSpc>
+                          <a:spcPct val="100000"/>
+                        </a:lnSpc>
+                        <a:spcBef>
+                          <a:spcPts val="0"/>
+                        </a:spcBef>
+                        <a:spcAft>
+                          <a:spcPts val="0"/>
+                        </a:spcAft>
+                        <a:buClrTx/>
+                        <a:buSzTx/>
+                        <a:buFont typeface="Arial" panose="020B0604020202020204" pitchFamily="34" charset="0"/>
+                        <a:buChar char="•"/>
+                        <a:tabLst/>
+                        <a:defRPr/>
+                      </a:pPr>
+                      <a:r>
+                        <a:rPr lang="en-US" dirty="0"/>
+                        <a:t>High input resistance can make them static sensitive</a:t>
+                      </a:r>
+                    </a:p>
+                  </a:txBody>
+                  <a:tcPr/>
+                </a:tc>
+                <a:extLst>
+                  <a:ext uri="{0D108BD9-81ED-4DB2-BD59-A6C34878D82A}">
+                    <a16:rowId xmlns:a16="http://schemas.microsoft.com/office/drawing/2014/main" val="2494442280"/>
+                  </a:ext>
+                </a:extLst>
+              </a:tr>
+              <a:tr h="1525957">
+                <a:tc gridSpan="2">
+                  <a:txBody>
+                    <a:bodyPr/>
+                    <a:lstStyle/>
+                    <a:p>
+                      <a:r>
+                        <a:rPr lang="en-US" sz="1600" b="1" dirty="0"/>
+                        <a:t>Notes:  </a:t>
+                      </a:r>
+                      <a:r>
+                        <a:rPr lang="en-US" sz="1600" dirty="0"/>
+                        <a:t>Unlike a relay wear and tear is negligible. </a:t>
+                      </a:r>
+                    </a:p>
+                    <a:p>
+                      <a:pPr marL="0" marR="0" lvl="0" indent="0" algn="l" defTabSz="914400" rtl="0" eaLnBrk="1" fontAlgn="auto" latinLnBrk="0" hangingPunct="1">
+                        <a:lnSpc>
+                          <a:spcPct val="100000"/>
+                        </a:lnSpc>
+                        <a:spcBef>
+                          <a:spcPts val="0"/>
+                        </a:spcBef>
+                        <a:spcAft>
+                          <a:spcPts val="0"/>
+                        </a:spcAft>
+                        <a:buClrTx/>
+                        <a:buSzTx/>
+                        <a:buFontTx/>
+                        <a:buNone/>
+                        <a:tabLst/>
+                        <a:defRPr/>
+                      </a:pPr>
+                      <a:r>
+                        <a:rPr lang="en-US" sz="1600" dirty="0"/>
+                        <a:t>A barebones MOSFET is a large 3 pin transistor.</a:t>
+                      </a:r>
+                    </a:p>
+                    <a:p>
+                      <a:pPr marL="0" marR="0" lvl="0" indent="0" algn="l" defTabSz="914400" rtl="0" eaLnBrk="1" fontAlgn="auto" latinLnBrk="0" hangingPunct="1">
+                        <a:lnSpc>
+                          <a:spcPct val="100000"/>
+                        </a:lnSpc>
+                        <a:spcBef>
+                          <a:spcPts val="0"/>
+                        </a:spcBef>
+                        <a:spcAft>
+                          <a:spcPts val="0"/>
+                        </a:spcAft>
+                        <a:buClrTx/>
+                        <a:buSzTx/>
+                        <a:buFontTx/>
+                        <a:buNone/>
+                        <a:tabLst/>
+                        <a:defRPr/>
+                      </a:pPr>
+                      <a:r>
+                        <a:rPr lang="en-US" sz="1600" dirty="0"/>
+                        <a:t>Good discussion here:</a:t>
+                      </a:r>
+                    </a:p>
+                    <a:p>
+                      <a:pPr marL="0" marR="0" lvl="0" indent="0" algn="l" defTabSz="914400" rtl="0" eaLnBrk="1" fontAlgn="auto" latinLnBrk="0" hangingPunct="1">
+                        <a:lnSpc>
+                          <a:spcPct val="100000"/>
+                        </a:lnSpc>
+                        <a:spcBef>
+                          <a:spcPts val="0"/>
+                        </a:spcBef>
+                        <a:spcAft>
+                          <a:spcPts val="0"/>
+                        </a:spcAft>
+                        <a:buClrTx/>
+                        <a:buSzTx/>
+                        <a:buFontTx/>
+                        <a:buNone/>
+                        <a:tabLst/>
+                        <a:defRPr/>
+                      </a:pPr>
+                      <a:r>
+                        <a:rPr lang="en-US" sz="1600" dirty="0">
+                          <a:hlinkClick r:id="rId3"/>
+                        </a:rPr>
+                        <a:t>https://www.youtube.com/watch?v=GrvvkYTW_0k</a:t>
+                      </a:r>
+                      <a:endParaRPr lang="en-US" sz="1600" dirty="0"/>
+                    </a:p>
+                    <a:p>
+                      <a:pPr marL="0" marR="0" lvl="0" indent="0" algn="l" defTabSz="914400" rtl="0" eaLnBrk="1" fontAlgn="auto" latinLnBrk="0" hangingPunct="1">
+                        <a:lnSpc>
+                          <a:spcPct val="100000"/>
+                        </a:lnSpc>
+                        <a:spcBef>
+                          <a:spcPts val="0"/>
+                        </a:spcBef>
+                        <a:spcAft>
+                          <a:spcPts val="0"/>
+                        </a:spcAft>
+                        <a:buClrTx/>
+                        <a:buSzTx/>
+                        <a:buFontTx/>
+                        <a:buNone/>
+                        <a:tabLst/>
+                        <a:defRPr/>
+                      </a:pPr>
+                      <a:r>
+                        <a:rPr lang="en-US" sz="1600" dirty="0"/>
+                        <a:t>and here:</a:t>
+                      </a:r>
+                      <a:endParaRPr lang="en-US" sz="1600" dirty="0">
+                        <a:hlinkClick r:id="rId4"/>
+                      </a:endParaRPr>
+                    </a:p>
+                    <a:p>
+                      <a:pPr marL="0" marR="0" lvl="0" indent="0" algn="l" defTabSz="914400" rtl="0" eaLnBrk="1" fontAlgn="auto" latinLnBrk="0" hangingPunct="1">
+                        <a:lnSpc>
+                          <a:spcPct val="100000"/>
+                        </a:lnSpc>
+                        <a:spcBef>
+                          <a:spcPts val="0"/>
+                        </a:spcBef>
+                        <a:spcAft>
+                          <a:spcPts val="0"/>
+                        </a:spcAft>
+                        <a:buClrTx/>
+                        <a:buSzTx/>
+                        <a:buFontTx/>
+                        <a:buNone/>
+                        <a:tabLst/>
+                        <a:defRPr/>
+                      </a:pPr>
+                      <a:r>
+                        <a:rPr lang="en-US" sz="1400" dirty="0">
+                          <a:hlinkClick r:id="rId4"/>
+                        </a:rPr>
+                        <a:t>https://forum.hobbycomponents.com/viewtopic.php?f=76&amp;t=1872</a:t>
+                      </a:r>
+                      <a:endParaRPr lang="en-US" sz="1400" dirty="0"/>
+                    </a:p>
+                    <a:p>
+                      <a:pPr marL="0" marR="0" lvl="0" indent="0" algn="l" defTabSz="914400" rtl="0" eaLnBrk="1" fontAlgn="auto" latinLnBrk="0" hangingPunct="1">
+                        <a:lnSpc>
+                          <a:spcPct val="100000"/>
+                        </a:lnSpc>
+                        <a:spcBef>
+                          <a:spcPts val="0"/>
+                        </a:spcBef>
+                        <a:spcAft>
+                          <a:spcPts val="0"/>
+                        </a:spcAft>
+                        <a:buClrTx/>
+                        <a:buSzTx/>
+                        <a:buFontTx/>
+                        <a:buNone/>
+                        <a:tabLst/>
+                        <a:defRPr/>
+                      </a:pPr>
+                      <a:r>
+                        <a:rPr lang="en-US" sz="1400" dirty="0"/>
+                        <a:t>Good Review of Data sheet here:</a:t>
+                      </a:r>
+                    </a:p>
+                    <a:p>
+                      <a:pPr marL="0" marR="0" lvl="0" indent="0" algn="l" defTabSz="914400" rtl="0" eaLnBrk="1" fontAlgn="auto" latinLnBrk="0" hangingPunct="1">
+                        <a:lnSpc>
+                          <a:spcPct val="100000"/>
+                        </a:lnSpc>
+                        <a:spcBef>
+                          <a:spcPts val="0"/>
+                        </a:spcBef>
+                        <a:spcAft>
+                          <a:spcPts val="0"/>
+                        </a:spcAft>
+                        <a:buClrTx/>
+                        <a:buSzTx/>
+                        <a:buFontTx/>
+                        <a:buNone/>
+                        <a:tabLst/>
+                        <a:defRPr/>
+                      </a:pPr>
+                      <a:r>
+                        <a:rPr lang="en-US" sz="1400" dirty="0">
+                          <a:hlinkClick r:id="rId5"/>
+                        </a:rPr>
+                        <a:t>https://www.youtube.com/watch?v=oEBS7kAJz6U</a:t>
+                      </a:r>
+                      <a:endParaRPr lang="en-US" sz="1400" dirty="0"/>
+                    </a:p>
+                  </a:txBody>
+                  <a:tcPr/>
+                </a:tc>
+                <a:tc hMerge="1">
+                  <a:txBody>
+                    <a:bodyPr/>
+                    <a:lstStyle/>
+                    <a:p>
+                      <a:endParaRPr lang="en-US"/>
+                    </a:p>
+                  </a:txBody>
+                  <a:tcPr/>
+                </a:tc>
+                <a:tc>
+                  <a:txBody>
+                    <a:bodyPr/>
+                    <a:lstStyle/>
+                    <a:p>
+                      <a:r>
+                        <a:rPr lang="en-US" b="1" dirty="0"/>
+                        <a:t>Electrical and thermal limits are very important. </a:t>
+                      </a:r>
+                    </a:p>
+                    <a:p>
+                      <a:r>
+                        <a:rPr lang="en-US" dirty="0"/>
+                        <a:t>The latter is often constraining. (A MOSFET can carry a lot of current but only if you can get rid of the heat). </a:t>
+                      </a:r>
+                    </a:p>
+                    <a:p>
+                      <a:r>
+                        <a:rPr lang="en-US" dirty="0"/>
+                        <a:t>Power (heat) = I</a:t>
+                      </a:r>
+                      <a:r>
+                        <a:rPr lang="en-US" baseline="30000" dirty="0"/>
+                        <a:t>2</a:t>
+                      </a:r>
+                      <a:r>
+                        <a:rPr lang="en-US" dirty="0"/>
+                        <a:t> R </a:t>
+                      </a:r>
+                    </a:p>
+                    <a:p>
+                      <a:r>
+                        <a:rPr lang="en-US" dirty="0"/>
+                        <a:t>The I is your current. I</a:t>
+                      </a:r>
+                      <a:r>
+                        <a:rPr lang="en-US" baseline="30000" dirty="0"/>
+                        <a:t>2  </a:t>
+                      </a:r>
+                      <a:r>
+                        <a:rPr lang="en-US" sz="1800" kern="1200" dirty="0">
+                          <a:solidFill>
+                            <a:schemeClr val="dk1"/>
+                          </a:solidFill>
+                          <a:latin typeface="+mn-lt"/>
+                          <a:ea typeface="+mn-ea"/>
+                          <a:cs typeface="+mn-cs"/>
+                        </a:rPr>
+                        <a:t>(I squared) is just I times itself.</a:t>
+                      </a:r>
+                    </a:p>
+                    <a:p>
+                      <a:r>
+                        <a:rPr lang="en-US" dirty="0"/>
+                        <a:t>The R here is the ‘on resistance’ of the device.</a:t>
+                      </a:r>
+                    </a:p>
+                  </a:txBody>
+                  <a:tcPr/>
+                </a:tc>
+                <a:extLst>
+                  <a:ext uri="{0D108BD9-81ED-4DB2-BD59-A6C34878D82A}">
+                    <a16:rowId xmlns:a16="http://schemas.microsoft.com/office/drawing/2014/main" val="1235703702"/>
+                  </a:ext>
+                </a:extLst>
+              </a:tr>
+            </a:tbl>
+          </a:graphicData>
+        </a:graphic>
+      </p:graphicFrame>
+      <p:sp>
+        <p:nvSpPr>
+          <p:cNvPr id="5" name="Subtitle 2">
+            <a:extLst>
+              <a:ext uri="{FF2B5EF4-FFF2-40B4-BE49-F238E27FC236}">
+                <a16:creationId xmlns:a16="http://schemas.microsoft.com/office/drawing/2014/main" id="{F81EB58B-60AE-9C27-0E97-2EB666C2CC13}"/>
+              </a:ext>
+            </a:extLst>
+          </p:cNvPr>
+          <p:cNvSpPr txBox="1">
+            <a:spLocks/>
+          </p:cNvSpPr>
+          <p:nvPr/>
+        </p:nvSpPr>
+        <p:spPr>
+          <a:xfrm>
+            <a:off x="560718" y="6177560"/>
+            <a:ext cx="1357223" cy="558771"/>
+          </a:xfrm>
+          <a:prstGeom prst="rect">
+            <a:avLst/>
+          </a:prstGeom>
+        </p:spPr>
+        <p:txBody>
+          <a:bodyPr vert="horz" lIns="91440" tIns="45720" rIns="91440" bIns="45720" rtlCol="0">
+            <a:noAutofit/>
+          </a:bodyPr>
+          <a:lstStyle>
+            <a:lvl1pPr marL="0" indent="0" algn="ctr" defTabSz="914400" rtl="0" eaLnBrk="1" latinLnBrk="0" hangingPunct="1">
+              <a:lnSpc>
+                <a:spcPct val="90000"/>
+              </a:lnSpc>
+              <a:spcBef>
+                <a:spcPts val="1000"/>
+              </a:spcBef>
+              <a:buFont typeface="Arial" panose="020B0604020202020204" pitchFamily="34" charset="0"/>
+              <a:buNone/>
+              <a:defRPr sz="2400" kern="1200">
+                <a:solidFill>
+                  <a:schemeClr val="tx1"/>
+                </a:solidFill>
+                <a:latin typeface="+mn-lt"/>
+                <a:ea typeface="+mn-ea"/>
+                <a:cs typeface="+mn-cs"/>
+              </a:defRPr>
+            </a:lvl1pPr>
+            <a:lvl2pPr marL="457200" indent="0" algn="ctr" defTabSz="914400" rtl="0" eaLnBrk="1" latinLnBrk="0" hangingPunct="1">
+              <a:lnSpc>
+                <a:spcPct val="90000"/>
+              </a:lnSpc>
+              <a:spcBef>
+                <a:spcPts val="500"/>
+              </a:spcBef>
+              <a:buFont typeface="Arial" panose="020B0604020202020204" pitchFamily="34" charset="0"/>
+              <a:buNone/>
+              <a:defRPr sz="2000" kern="1200">
+                <a:solidFill>
+                  <a:schemeClr val="tx1"/>
+                </a:solidFill>
+                <a:latin typeface="+mn-lt"/>
+                <a:ea typeface="+mn-ea"/>
+                <a:cs typeface="+mn-cs"/>
+              </a:defRPr>
+            </a:lvl2pPr>
+            <a:lvl3pPr marL="914400" indent="0" algn="ctr" defTabSz="914400" rtl="0" eaLnBrk="1" latinLnBrk="0" hangingPunct="1">
+              <a:lnSpc>
+                <a:spcPct val="90000"/>
+              </a:lnSpc>
+              <a:spcBef>
+                <a:spcPts val="500"/>
+              </a:spcBef>
+              <a:buFont typeface="Arial" panose="020B0604020202020204" pitchFamily="34" charset="0"/>
+              <a:buNone/>
+              <a:defRPr sz="1800" kern="1200">
+                <a:solidFill>
+                  <a:schemeClr val="tx1"/>
+                </a:solidFill>
+                <a:latin typeface="+mn-lt"/>
+                <a:ea typeface="+mn-ea"/>
+                <a:cs typeface="+mn-cs"/>
+              </a:defRPr>
+            </a:lvl3pPr>
+            <a:lvl4pPr marL="1371600" indent="0" algn="ctr" defTabSz="914400" rtl="0" eaLnBrk="1" latinLnBrk="0" hangingPunct="1">
+              <a:lnSpc>
+                <a:spcPct val="90000"/>
+              </a:lnSpc>
+              <a:spcBef>
+                <a:spcPts val="500"/>
+              </a:spcBef>
+              <a:buFont typeface="Arial" panose="020B0604020202020204" pitchFamily="34" charset="0"/>
+              <a:buNone/>
+              <a:defRPr sz="1600" kern="1200">
+                <a:solidFill>
+                  <a:schemeClr val="tx1"/>
+                </a:solidFill>
+                <a:latin typeface="+mn-lt"/>
+                <a:ea typeface="+mn-ea"/>
+                <a:cs typeface="+mn-cs"/>
+              </a:defRPr>
+            </a:lvl4pPr>
+            <a:lvl5pPr marL="1828800" indent="0" algn="ctr" defTabSz="914400" rtl="0" eaLnBrk="1" latinLnBrk="0" hangingPunct="1">
+              <a:lnSpc>
+                <a:spcPct val="90000"/>
+              </a:lnSpc>
+              <a:spcBef>
+                <a:spcPts val="500"/>
+              </a:spcBef>
+              <a:buFont typeface="Arial" panose="020B0604020202020204" pitchFamily="34" charset="0"/>
+              <a:buNone/>
+              <a:defRPr sz="1600" kern="1200">
+                <a:solidFill>
+                  <a:schemeClr val="tx1"/>
+                </a:solidFill>
+                <a:latin typeface="+mn-lt"/>
+                <a:ea typeface="+mn-ea"/>
+                <a:cs typeface="+mn-cs"/>
+              </a:defRPr>
+            </a:lvl5pPr>
+            <a:lvl6pPr marL="2286000" indent="0" algn="ctr" defTabSz="914400" rtl="0" eaLnBrk="1" latinLnBrk="0" hangingPunct="1">
+              <a:lnSpc>
+                <a:spcPct val="90000"/>
+              </a:lnSpc>
+              <a:spcBef>
+                <a:spcPts val="500"/>
+              </a:spcBef>
+              <a:buFont typeface="Arial" panose="020B0604020202020204" pitchFamily="34" charset="0"/>
+              <a:buNone/>
+              <a:defRPr sz="1600" kern="1200">
+                <a:solidFill>
+                  <a:schemeClr val="tx1"/>
+                </a:solidFill>
+                <a:latin typeface="+mn-lt"/>
+                <a:ea typeface="+mn-ea"/>
+                <a:cs typeface="+mn-cs"/>
+              </a:defRPr>
+            </a:lvl6pPr>
+            <a:lvl7pPr marL="2743200" indent="0" algn="ctr" defTabSz="914400" rtl="0" eaLnBrk="1" latinLnBrk="0" hangingPunct="1">
+              <a:lnSpc>
+                <a:spcPct val="90000"/>
+              </a:lnSpc>
+              <a:spcBef>
+                <a:spcPts val="500"/>
+              </a:spcBef>
+              <a:buFont typeface="Arial" panose="020B0604020202020204" pitchFamily="34" charset="0"/>
+              <a:buNone/>
+              <a:defRPr sz="1600" kern="1200">
+                <a:solidFill>
+                  <a:schemeClr val="tx1"/>
+                </a:solidFill>
+                <a:latin typeface="+mn-lt"/>
+                <a:ea typeface="+mn-ea"/>
+                <a:cs typeface="+mn-cs"/>
+              </a:defRPr>
+            </a:lvl7pPr>
+            <a:lvl8pPr marL="3200400" indent="0" algn="ctr" defTabSz="914400" rtl="0" eaLnBrk="1" latinLnBrk="0" hangingPunct="1">
+              <a:lnSpc>
+                <a:spcPct val="90000"/>
+              </a:lnSpc>
+              <a:spcBef>
+                <a:spcPts val="500"/>
+              </a:spcBef>
+              <a:buFont typeface="Arial" panose="020B0604020202020204" pitchFamily="34" charset="0"/>
+              <a:buNone/>
+              <a:defRPr sz="1600" kern="1200">
+                <a:solidFill>
+                  <a:schemeClr val="tx1"/>
+                </a:solidFill>
+                <a:latin typeface="+mn-lt"/>
+                <a:ea typeface="+mn-ea"/>
+                <a:cs typeface="+mn-cs"/>
+              </a:defRPr>
+            </a:lvl8pPr>
+            <a:lvl9pPr marL="3657600" indent="0" algn="ctr" defTabSz="914400" rtl="0" eaLnBrk="1" latinLnBrk="0" hangingPunct="1">
+              <a:lnSpc>
+                <a:spcPct val="90000"/>
+              </a:lnSpc>
+              <a:spcBef>
+                <a:spcPts val="500"/>
+              </a:spcBef>
+              <a:buFont typeface="Arial" panose="020B0604020202020204" pitchFamily="34" charset="0"/>
+              <a:buNone/>
+              <a:defRPr sz="1600" kern="1200">
+                <a:solidFill>
+                  <a:schemeClr val="tx1"/>
+                </a:solidFill>
+                <a:latin typeface="+mn-lt"/>
+                <a:ea typeface="+mn-ea"/>
+                <a:cs typeface="+mn-cs"/>
+              </a:defRPr>
+            </a:lvl9pPr>
+          </a:lstStyle>
+          <a:p>
+            <a:endParaRPr lang="en-US" sz="3200" b="1" dirty="0">
+              <a:solidFill>
+                <a:schemeClr val="accent1">
+                  <a:lumMod val="60000"/>
+                  <a:lumOff val="40000"/>
+                </a:schemeClr>
+              </a:solidFill>
+              <a:latin typeface="MERG_Logo" pitchFamily="2" charset="0"/>
+            </a:endParaRPr>
+          </a:p>
+        </p:txBody>
+      </p:sp>
+      <p:pic>
+        <p:nvPicPr>
+          <p:cNvPr id="6" name="Picture 5">
+            <a:extLst>
+              <a:ext uri="{FF2B5EF4-FFF2-40B4-BE49-F238E27FC236}">
+                <a16:creationId xmlns:a16="http://schemas.microsoft.com/office/drawing/2014/main" id="{F56229F6-7040-FEA1-9A6F-B1C968B23931}"/>
+              </a:ext>
+            </a:extLst>
+          </p:cNvPr>
+          <p:cNvPicPr>
+            <a:picLocks noChangeAspect="1"/>
+          </p:cNvPicPr>
+          <p:nvPr/>
+        </p:nvPicPr>
+        <p:blipFill>
+          <a:blip r:embed="rId6" cstate="email">
+            <a:extLst>
+              <a:ext uri="{28A0092B-C50C-407E-A947-70E740481C1C}">
+                <a14:useLocalDpi xmlns:a14="http://schemas.microsoft.com/office/drawing/2010/main"/>
+              </a:ext>
+            </a:extLst>
+          </a:blip>
+          <a:stretch>
+            <a:fillRect/>
+          </a:stretch>
+        </p:blipFill>
+        <p:spPr>
+          <a:xfrm>
+            <a:off x="10749400" y="6239363"/>
+            <a:ext cx="1116784" cy="496968"/>
+          </a:xfrm>
+          <a:prstGeom prst="rect">
+            <a:avLst/>
+          </a:prstGeom>
+        </p:spPr>
+      </p:pic>
+      <p:pic>
+        <p:nvPicPr>
+          <p:cNvPr id="12" name="Picture 11">
+            <a:extLst>
+              <a:ext uri="{FF2B5EF4-FFF2-40B4-BE49-F238E27FC236}">
+                <a16:creationId xmlns:a16="http://schemas.microsoft.com/office/drawing/2014/main" id="{B081CF63-6D84-FFD1-7A96-4CAE2A29A94B}"/>
+              </a:ext>
+            </a:extLst>
+          </p:cNvPr>
+          <p:cNvPicPr>
+            <a:picLocks noChangeAspect="1"/>
+          </p:cNvPicPr>
+          <p:nvPr/>
+        </p:nvPicPr>
+        <p:blipFill>
+          <a:blip r:embed="rId7"/>
+          <a:stretch>
+            <a:fillRect/>
+          </a:stretch>
+        </p:blipFill>
+        <p:spPr>
+          <a:xfrm>
+            <a:off x="6922425" y="1343935"/>
+            <a:ext cx="1725376" cy="1338975"/>
+          </a:xfrm>
+          <a:prstGeom prst="rect">
+            <a:avLst/>
+          </a:prstGeom>
+        </p:spPr>
+      </p:pic>
+      <p:pic>
+        <p:nvPicPr>
+          <p:cNvPr id="14" name="Picture 13">
+            <a:extLst>
+              <a:ext uri="{FF2B5EF4-FFF2-40B4-BE49-F238E27FC236}">
+                <a16:creationId xmlns:a16="http://schemas.microsoft.com/office/drawing/2014/main" id="{74DBF724-8141-5BAE-12EF-E9BBD62CC3F3}"/>
+              </a:ext>
+            </a:extLst>
+          </p:cNvPr>
+          <p:cNvPicPr>
+            <a:picLocks noChangeAspect="1"/>
+          </p:cNvPicPr>
+          <p:nvPr/>
+        </p:nvPicPr>
+        <p:blipFill>
+          <a:blip r:embed="rId8"/>
+          <a:stretch>
+            <a:fillRect/>
+          </a:stretch>
+        </p:blipFill>
+        <p:spPr>
+          <a:xfrm>
+            <a:off x="9349076" y="1343935"/>
+            <a:ext cx="2283817" cy="1338975"/>
+          </a:xfrm>
+          <a:prstGeom prst="rect">
+            <a:avLst/>
+          </a:prstGeom>
+        </p:spPr>
+      </p:pic>
+    </p:spTree>
+    <p:extLst>
+      <p:ext uri="{BB962C8B-B14F-4D97-AF65-F5344CB8AC3E}">
+        <p14:creationId xmlns:p14="http://schemas.microsoft.com/office/powerpoint/2010/main" val="1194342853"/>
+      </p:ext>
+    </p:extLst>
+  </p:cSld>
+  <p:clrMapOvr>
+    <a:masterClrMapping/>
+  </p:clrMapOvr>
+</p:sld>
+</file>
+
+<file path=ppt/slides/slide28.xml><?xml version="1.0" encoding="utf-8"?>
+<p:sld xmlns:a="http://schemas.openxmlformats.org/drawingml/2006/main" xmlns:r="http://schemas.openxmlformats.org/officeDocument/2006/relationships" xmlns:p="http://schemas.openxmlformats.org/presentationml/2006/main">
+  <p:cSld>
+    <p:spTree>
+      <p:nvGrpSpPr>
+        <p:cNvPr id="1" name=""/>
+        <p:cNvGrpSpPr/>
+        <p:nvPr/>
+      </p:nvGrpSpPr>
+      <p:grpSpPr>
+        <a:xfrm>
+          <a:off x="0" y="0"/>
+          <a:ext cx="0" cy="0"/>
+          <a:chOff x="0" y="0"/>
+          <a:chExt cx="0" cy="0"/>
+        </a:xfrm>
+      </p:grpSpPr>
+      <p:graphicFrame>
+        <p:nvGraphicFramePr>
+          <p:cNvPr id="7" name="Table 7">
+            <a:extLst>
+              <a:ext uri="{FF2B5EF4-FFF2-40B4-BE49-F238E27FC236}">
+                <a16:creationId xmlns:a16="http://schemas.microsoft.com/office/drawing/2014/main" id="{9B2F03AA-E6B2-4CB4-910F-7DA903FD6ED6}"/>
+              </a:ext>
+            </a:extLst>
+          </p:cNvPr>
+          <p:cNvGraphicFramePr>
+            <a:graphicFrameLocks noGrp="1"/>
+          </p:cNvGraphicFramePr>
+          <p:nvPr>
+            <p:extLst>
+              <p:ext uri="{D42A27DB-BD31-4B8C-83A1-F6EECF244321}">
+                <p14:modId xmlns:p14="http://schemas.microsoft.com/office/powerpoint/2010/main" val="4111873260"/>
               </p:ext>
             </p:extLst>
           </p:nvPr>
@@ -22560,7 +23563,7 @@
                     <a:p>
                       <a:r>
                         <a:rPr lang="en-US" sz="4400" dirty="0"/>
-                        <a:t>11b</a:t>
+                        <a:t>11c</a:t>
                       </a:r>
                     </a:p>
                   </a:txBody>
@@ -22577,7 +23580,7 @@
                             <a:srgbClr val="FFFF00"/>
                           </a:solidFill>
                         </a:rPr>
-                        <a:t>MOSFET</a:t>
+                        <a:t>Opto-MOSFET</a:t>
                       </a:r>
                     </a:p>
                   </a:txBody>
@@ -22661,12 +23664,6 @@
                     <a:bodyPr/>
                     <a:lstStyle/>
                     <a:p>
-                      <a:r>
-                        <a:rPr lang="en-US" b="1" dirty="0"/>
-                        <a:t>Photo:</a:t>
-                      </a:r>
-                    </a:p>
-                    <a:p>
                       <a:endParaRPr lang="en-US" dirty="0"/>
                     </a:p>
                   </a:txBody>
@@ -22726,15 +23723,7 @@
                       </a:pPr>
                       <a:r>
                         <a:rPr lang="en-US" dirty="0"/>
-                        <a:t>A low power digital </a:t>
-                      </a:r>
-                      <a:r>
-                        <a:rPr lang="en-US" b="1" dirty="0"/>
-                        <a:t>voltage</a:t>
-                      </a:r>
-                      <a:r>
-                        <a:rPr lang="en-US" dirty="0"/>
-                        <a:t> signal is applied to the gate of the device. This allows a higher current to flow from the source to the drain. </a:t>
+                        <a:t>A low power digital voltage signal is applied to a fully enclosed LED. The led activates the gate of two back to back MOSFETs in the same package. This means current can flow in either direction. Effectively you light an LED and the LED turns something else on. </a:t>
                       </a:r>
                     </a:p>
                   </a:txBody>
@@ -22821,22 +23810,6 @@
                       <a:r>
                         <a:rPr lang="en-US" dirty="0"/>
                         <a:t>Allows switching electrical loads beyond the rating of an Arduino alone. </a:t>
-                      </a:r>
-                    </a:p>
-                    <a:p>
-                      <a:r>
-                        <a:rPr lang="en-US" b="1" dirty="0"/>
-                        <a:t>Cons:</a:t>
-                      </a:r>
-                    </a:p>
-                    <a:p>
-                      <a:pPr marL="285750" indent="-285750">
-                        <a:buFont typeface="Arial" panose="020B0604020202020204" pitchFamily="34" charset="0"/>
-                        <a:buChar char="•"/>
-                      </a:pPr>
-                      <a:r>
-                        <a:rPr lang="en-US" dirty="0"/>
-                        <a:t>Modules are Physically large</a:t>
                       </a:r>
                     </a:p>
                   </a:txBody>
@@ -22866,13 +23839,7 @@
                     <a:p>
                       <a:r>
                         <a:rPr lang="en-US" dirty="0"/>
-                        <a:t>Electrical and thermal limits are important. </a:t>
-                      </a:r>
-                    </a:p>
-                    <a:p>
-                      <a:r>
-                        <a:rPr lang="en-US" dirty="0"/>
-                        <a:t>The latter is often constraining. (A MOSFET can carry a lot of current but only if you can get rid of the heat).</a:t>
+                        <a:t>The use of opto-coupling means the input circuit and the output circuit need not have anything in common. </a:t>
                       </a:r>
                     </a:p>
                   </a:txBody>
@@ -22892,29 +23859,6 @@
                   <a:txBody>
                     <a:bodyPr/>
                     <a:lstStyle/>
-                    <a:p>
-                      <a:pPr marL="0" marR="0" lvl="0" indent="0" algn="l" defTabSz="914400" rtl="0" eaLnBrk="1" fontAlgn="auto" latinLnBrk="0" hangingPunct="1">
-                        <a:lnSpc>
-                          <a:spcPct val="100000"/>
-                        </a:lnSpc>
-                        <a:spcBef>
-                          <a:spcPts val="0"/>
-                        </a:spcBef>
-                        <a:spcAft>
-                          <a:spcPts val="0"/>
-                        </a:spcAft>
-                        <a:buClrTx/>
-                        <a:buSzTx/>
-                        <a:buFontTx/>
-                        <a:buNone/>
-                        <a:tabLst/>
-                        <a:defRPr/>
-                      </a:pPr>
-                      <a:r>
-                        <a:rPr lang="en-US" dirty="0"/>
-                        <a:t>Barebones MOSFET device is like a large 3 pin transistor.</a:t>
-                      </a:r>
-                    </a:p>
                     <a:p>
                       <a:pPr marL="0" marR="0" lvl="0" indent="0" algn="l" defTabSz="914400" rtl="0" eaLnBrk="1" fontAlgn="auto" latinLnBrk="0" hangingPunct="1">
                         <a:lnSpc>
@@ -23190,10 +24134,10 @@
       </p:pic>
       <p:pic>
         <p:nvPicPr>
-          <p:cNvPr id="12" name="Picture 11">
+          <p:cNvPr id="4" name="Picture 3">
             <a:extLst>
               <a:ext uri="{FF2B5EF4-FFF2-40B4-BE49-F238E27FC236}">
-                <a16:creationId xmlns:a16="http://schemas.microsoft.com/office/drawing/2014/main" id="{B081CF63-6D84-FFD1-7A96-4CAE2A29A94B}"/>
+                <a16:creationId xmlns:a16="http://schemas.microsoft.com/office/drawing/2014/main" id="{A4CA5CE5-E6F6-75AE-4150-17AA59A19687}"/>
               </a:ext>
             </a:extLst>
           </p:cNvPr>
@@ -23210,8 +24154,8 @@
         </p:blipFill>
         <p:spPr>
           <a:xfrm>
-            <a:off x="6922425" y="1343935"/>
-            <a:ext cx="1725376" cy="1338975"/>
+            <a:off x="6213384" y="1374949"/>
+            <a:ext cx="1208369" cy="1277815"/>
           </a:xfrm>
           <a:prstGeom prst="rect">
             <a:avLst/>
@@ -23220,10 +24164,10 @@
       </p:pic>
       <p:pic>
         <p:nvPicPr>
-          <p:cNvPr id="14" name="Picture 13">
+          <p:cNvPr id="10" name="Picture 9">
             <a:extLst>
               <a:ext uri="{FF2B5EF4-FFF2-40B4-BE49-F238E27FC236}">
-                <a16:creationId xmlns:a16="http://schemas.microsoft.com/office/drawing/2014/main" id="{74DBF724-8141-5BAE-12EF-E9BBD62CC3F3}"/>
+                <a16:creationId xmlns:a16="http://schemas.microsoft.com/office/drawing/2014/main" id="{F69B97C9-055B-8F3C-201F-4E09362FBA7B}"/>
               </a:ext>
             </a:extLst>
           </p:cNvPr>
@@ -23240,832 +24184,8 @@
         </p:blipFill>
         <p:spPr>
           <a:xfrm>
-            <a:off x="9349076" y="1343935"/>
-            <a:ext cx="2283817" cy="1338975"/>
-          </a:xfrm>
-          <a:prstGeom prst="rect">
-            <a:avLst/>
-          </a:prstGeom>
-        </p:spPr>
-      </p:pic>
-    </p:spTree>
-    <p:extLst>
-      <p:ext uri="{BB962C8B-B14F-4D97-AF65-F5344CB8AC3E}">
-        <p14:creationId xmlns:p14="http://schemas.microsoft.com/office/powerpoint/2010/main" val="1194342853"/>
-      </p:ext>
-    </p:extLst>
-  </p:cSld>
-  <p:clrMapOvr>
-    <a:masterClrMapping/>
-  </p:clrMapOvr>
-</p:sld>
-</file>
-
-<file path=ppt/slides/slide28.xml><?xml version="1.0" encoding="utf-8"?>
-<p:sld xmlns:a="http://schemas.openxmlformats.org/drawingml/2006/main" xmlns:r="http://schemas.openxmlformats.org/officeDocument/2006/relationships" xmlns:p="http://schemas.openxmlformats.org/presentationml/2006/main">
-  <p:cSld>
-    <p:spTree>
-      <p:nvGrpSpPr>
-        <p:cNvPr id="1" name=""/>
-        <p:cNvGrpSpPr/>
-        <p:nvPr/>
-      </p:nvGrpSpPr>
-      <p:grpSpPr>
-        <a:xfrm>
-          <a:off x="0" y="0"/>
-          <a:ext cx="0" cy="0"/>
-          <a:chOff x="0" y="0"/>
-          <a:chExt cx="0" cy="0"/>
-        </a:xfrm>
-      </p:grpSpPr>
-      <p:graphicFrame>
-        <p:nvGraphicFramePr>
-          <p:cNvPr id="7" name="Table 7">
-            <a:extLst>
-              <a:ext uri="{FF2B5EF4-FFF2-40B4-BE49-F238E27FC236}">
-                <a16:creationId xmlns:a16="http://schemas.microsoft.com/office/drawing/2014/main" id="{9B2F03AA-E6B2-4CB4-910F-7DA903FD6ED6}"/>
-              </a:ext>
-            </a:extLst>
-          </p:cNvPr>
-          <p:cNvGraphicFramePr>
-            <a:graphicFrameLocks noGrp="1"/>
-          </p:cNvGraphicFramePr>
-          <p:nvPr>
-            <p:extLst>
-              <p:ext uri="{D42A27DB-BD31-4B8C-83A1-F6EECF244321}">
-                <p14:modId xmlns:p14="http://schemas.microsoft.com/office/powerpoint/2010/main" val="2233208903"/>
-              </p:ext>
-            </p:extLst>
-          </p:nvPr>
-        </p:nvGraphicFramePr>
-        <p:xfrm>
-          <a:off x="415505" y="391004"/>
-          <a:ext cx="11360989" cy="5588081"/>
-        </p:xfrm>
-        <a:graphic>
-          <a:graphicData uri="http://schemas.openxmlformats.org/drawingml/2006/table">
-            <a:tbl>
-              <a:tblPr firstRow="1" bandRow="1">
-                <a:tableStyleId>{5C22544A-7EE6-4342-B048-85BDC9FD1C3A}</a:tableStyleId>
-              </a:tblPr>
-              <a:tblGrid>
-                <a:gridCol w="1130060">
-                  <a:extLst>
-                    <a:ext uri="{9D8B030D-6E8A-4147-A177-3AD203B41FA5}">
-                      <a16:colId xmlns:a16="http://schemas.microsoft.com/office/drawing/2014/main" val="747525499"/>
-                    </a:ext>
-                  </a:extLst>
-                </a:gridCol>
-                <a:gridCol w="4466567">
-                  <a:extLst>
-                    <a:ext uri="{9D8B030D-6E8A-4147-A177-3AD203B41FA5}">
-                      <a16:colId xmlns:a16="http://schemas.microsoft.com/office/drawing/2014/main" val="2892156475"/>
-                    </a:ext>
-                  </a:extLst>
-                </a:gridCol>
-                <a:gridCol w="5764362">
-                  <a:extLst>
-                    <a:ext uri="{9D8B030D-6E8A-4147-A177-3AD203B41FA5}">
-                      <a16:colId xmlns:a16="http://schemas.microsoft.com/office/drawing/2014/main" val="3449804923"/>
-                    </a:ext>
-                  </a:extLst>
-                </a:gridCol>
-              </a:tblGrid>
-              <a:tr h="919355">
-                <a:tc>
-                  <a:txBody>
-                    <a:bodyPr/>
-                    <a:lstStyle/>
-                    <a:p>
-                      <a:r>
-                        <a:rPr lang="en-US" sz="4400" dirty="0"/>
-                        <a:t>11c</a:t>
-                      </a:r>
-                    </a:p>
-                  </a:txBody>
-                  <a:tcPr/>
-                </a:tc>
-                <a:tc>
-                  <a:txBody>
-                    <a:bodyPr/>
-                    <a:lstStyle/>
-                    <a:p>
-                      <a:r>
-                        <a:rPr lang="en-US" sz="4400" dirty="0">
-                          <a:solidFill>
-                            <a:srgbClr val="FFFF00"/>
-                          </a:solidFill>
-                        </a:rPr>
-                        <a:t>Opto-MOSFET</a:t>
-                      </a:r>
-                    </a:p>
-                  </a:txBody>
-                  <a:tcPr/>
-                </a:tc>
-                <a:tc>
-                  <a:txBody>
-                    <a:bodyPr/>
-                    <a:lstStyle/>
-                    <a:p>
-                      <a:pPr marL="0" marR="0" lvl="0" indent="0" algn="l" defTabSz="914400" rtl="0" eaLnBrk="1" fontAlgn="auto" latinLnBrk="0" hangingPunct="1">
-                        <a:lnSpc>
-                          <a:spcPct val="100000"/>
-                        </a:lnSpc>
-                        <a:spcBef>
-                          <a:spcPts val="0"/>
-                        </a:spcBef>
-                        <a:spcAft>
-                          <a:spcPts val="0"/>
-                        </a:spcAft>
-                        <a:buClrTx/>
-                        <a:buSzTx/>
-                        <a:buFontTx/>
-                        <a:buNone/>
-                        <a:tabLst/>
-                        <a:defRPr/>
-                      </a:pPr>
-                      <a:r>
-                        <a:rPr lang="en-US" sz="4400" b="1" kern="1200" dirty="0">
-                          <a:solidFill>
-                            <a:schemeClr val="lt1"/>
-                          </a:solidFill>
-                          <a:latin typeface="+mn-lt"/>
-                          <a:ea typeface="+mn-ea"/>
-                          <a:cs typeface="+mn-cs"/>
-                        </a:rPr>
-                        <a:t>Electronic Switch</a:t>
-                      </a:r>
-                    </a:p>
-                  </a:txBody>
-                  <a:tcPr/>
-                </a:tc>
-                <a:extLst>
-                  <a:ext uri="{0D108BD9-81ED-4DB2-BD59-A6C34878D82A}">
-                    <a16:rowId xmlns:a16="http://schemas.microsoft.com/office/drawing/2014/main" val="4166713368"/>
-                  </a:ext>
-                </a:extLst>
-              </a:tr>
-              <a:tr h="1405409">
-                <a:tc gridSpan="2">
-                  <a:txBody>
-                    <a:bodyPr/>
-                    <a:lstStyle/>
-                    <a:p>
-                      <a:r>
-                        <a:rPr lang="en-US" b="1" dirty="0"/>
-                        <a:t>Usage:</a:t>
-                      </a:r>
-                    </a:p>
-                    <a:p>
-                      <a:r>
-                        <a:rPr lang="en-US" dirty="0"/>
-                        <a:t>Low power output from Arduino Pin can control a higher power electrical circuit. </a:t>
-                      </a:r>
-                    </a:p>
-                    <a:p>
-                      <a:r>
-                        <a:rPr lang="en-US" dirty="0"/>
-                        <a:t>It is essentially a relay replacement. </a:t>
-                      </a:r>
-                    </a:p>
-                  </a:txBody>
-                  <a:tcPr/>
-                </a:tc>
-                <a:tc hMerge="1">
-                  <a:txBody>
-                    <a:bodyPr/>
-                    <a:lstStyle/>
-                    <a:p>
-                      <a:endParaRPr lang="en-US"/>
-                    </a:p>
-                  </a:txBody>
-                  <a:tcPr/>
-                </a:tc>
-                <a:tc>
-                  <a:txBody>
-                    <a:bodyPr/>
-                    <a:lstStyle/>
-                    <a:p>
-                      <a:r>
-                        <a:rPr lang="en-US" b="1" dirty="0"/>
-                        <a:t>Photo:</a:t>
-                      </a:r>
-                    </a:p>
-                    <a:p>
-                      <a:pPr marL="0" marR="0" lvl="0" indent="0" algn="l" defTabSz="914400" rtl="0" eaLnBrk="1" fontAlgn="auto" latinLnBrk="0" hangingPunct="1">
-                        <a:lnSpc>
-                          <a:spcPct val="100000"/>
-                        </a:lnSpc>
-                        <a:spcBef>
-                          <a:spcPts val="0"/>
-                        </a:spcBef>
-                        <a:spcAft>
-                          <a:spcPts val="0"/>
-                        </a:spcAft>
-                        <a:buClrTx/>
-                        <a:buSzTx/>
-                        <a:buFontTx/>
-                        <a:buNone/>
-                        <a:tabLst/>
-                        <a:defRPr/>
-                      </a:pPr>
-                      <a:r>
-                        <a:rPr lang="en-US" dirty="0"/>
-                        <a:t>Barebones MOSFET device</a:t>
-                      </a:r>
-                    </a:p>
-                    <a:p>
-                      <a:pPr marL="0" marR="0" lvl="0" indent="0" algn="l" defTabSz="914400" rtl="0" eaLnBrk="1" fontAlgn="auto" latinLnBrk="0" hangingPunct="1">
-                        <a:lnSpc>
-                          <a:spcPct val="100000"/>
-                        </a:lnSpc>
-                        <a:spcBef>
-                          <a:spcPts val="0"/>
-                        </a:spcBef>
-                        <a:spcAft>
-                          <a:spcPts val="0"/>
-                        </a:spcAft>
-                        <a:buClrTx/>
-                        <a:buSzTx/>
-                        <a:buFontTx/>
-                        <a:buNone/>
-                        <a:tabLst/>
-                        <a:defRPr/>
-                      </a:pPr>
-                      <a:r>
-                        <a:rPr lang="en-US" dirty="0"/>
-                        <a:t>is like a large 3 pin transistor.</a:t>
-                      </a:r>
-                    </a:p>
-                    <a:p>
-                      <a:endParaRPr lang="en-US" dirty="0"/>
-                    </a:p>
-                  </a:txBody>
-                  <a:tcPr/>
-                </a:tc>
-                <a:extLst>
-                  <a:ext uri="{0D108BD9-81ED-4DB2-BD59-A6C34878D82A}">
-                    <a16:rowId xmlns:a16="http://schemas.microsoft.com/office/drawing/2014/main" val="1083252038"/>
-                  </a:ext>
-                </a:extLst>
-              </a:tr>
-              <a:tr h="1525957">
-                <a:tc gridSpan="2">
-                  <a:txBody>
-                    <a:bodyPr/>
-                    <a:lstStyle/>
-                    <a:p>
-                      <a:pPr marL="0" marR="0" lvl="0" indent="0" algn="l" defTabSz="914400" rtl="0" eaLnBrk="1" fontAlgn="auto" latinLnBrk="0" hangingPunct="1">
-                        <a:lnSpc>
-                          <a:spcPct val="100000"/>
-                        </a:lnSpc>
-                        <a:spcBef>
-                          <a:spcPts val="0"/>
-                        </a:spcBef>
-                        <a:spcAft>
-                          <a:spcPts val="0"/>
-                        </a:spcAft>
-                        <a:buClrTx/>
-                        <a:buSzTx/>
-                        <a:buFontTx/>
-                        <a:buNone/>
-                        <a:tabLst/>
-                        <a:defRPr/>
-                      </a:pPr>
-                      <a:r>
-                        <a:rPr lang="en-US" b="1" dirty="0"/>
-                        <a:t>How it Works:</a:t>
-                      </a:r>
-                    </a:p>
-                    <a:p>
-                      <a:pPr marL="0" marR="0" lvl="0" indent="0" algn="l" defTabSz="914400" rtl="0" eaLnBrk="1" fontAlgn="auto" latinLnBrk="0" hangingPunct="1">
-                        <a:lnSpc>
-                          <a:spcPct val="100000"/>
-                        </a:lnSpc>
-                        <a:spcBef>
-                          <a:spcPts val="0"/>
-                        </a:spcBef>
-                        <a:spcAft>
-                          <a:spcPts val="0"/>
-                        </a:spcAft>
-                        <a:buClrTx/>
-                        <a:buSzTx/>
-                        <a:buFontTx/>
-                        <a:buNone/>
-                        <a:tabLst/>
-                        <a:defRPr/>
-                      </a:pPr>
-                      <a:r>
-                        <a:rPr lang="en-US" dirty="0"/>
-                        <a:t>A low power digital voltage signal is applied to a fully enclosed LED. The led activates the gate of a MOSFET which is in the same package. Effectively you light an LED and the LED turns something else on. </a:t>
-                      </a:r>
-                    </a:p>
-                  </a:txBody>
-                  <a:tcPr/>
-                </a:tc>
-                <a:tc hMerge="1">
-                  <a:txBody>
-                    <a:bodyPr/>
-                    <a:lstStyle/>
-                    <a:p>
-                      <a:endParaRPr lang="en-US"/>
-                    </a:p>
-                  </a:txBody>
-                  <a:tcPr/>
-                </a:tc>
-                <a:tc>
-                  <a:txBody>
-                    <a:bodyPr/>
-                    <a:lstStyle/>
-                    <a:p>
-                      <a:pPr marL="0" marR="0" lvl="0" indent="0" algn="l" defTabSz="914400" rtl="0" eaLnBrk="1" fontAlgn="auto" latinLnBrk="0" hangingPunct="1">
-                        <a:lnSpc>
-                          <a:spcPct val="100000"/>
-                        </a:lnSpc>
-                        <a:spcBef>
-                          <a:spcPts val="0"/>
-                        </a:spcBef>
-                        <a:spcAft>
-                          <a:spcPts val="0"/>
-                        </a:spcAft>
-                        <a:buClrTx/>
-                        <a:buSzTx/>
-                        <a:buFontTx/>
-                        <a:buNone/>
-                        <a:tabLst/>
-                        <a:defRPr/>
-                      </a:pPr>
-                      <a:r>
-                        <a:rPr lang="en-US" b="1" dirty="0"/>
-                        <a:t>Pros:</a:t>
-                      </a:r>
-                    </a:p>
-                    <a:p>
-                      <a:pPr marL="285750" marR="0" lvl="0" indent="-285750" algn="l" defTabSz="914400" rtl="0" eaLnBrk="1" fontAlgn="auto" latinLnBrk="0" hangingPunct="1">
-                        <a:lnSpc>
-                          <a:spcPct val="100000"/>
-                        </a:lnSpc>
-                        <a:spcBef>
-                          <a:spcPts val="0"/>
-                        </a:spcBef>
-                        <a:spcAft>
-                          <a:spcPts val="0"/>
-                        </a:spcAft>
-                        <a:buClrTx/>
-                        <a:buSzTx/>
-                        <a:buFont typeface="Arial" panose="020B0604020202020204" pitchFamily="34" charset="0"/>
-                        <a:buChar char="•"/>
-                        <a:tabLst/>
-                        <a:defRPr/>
-                      </a:pPr>
-                      <a:r>
-                        <a:rPr lang="en-US" dirty="0"/>
-                        <a:t>Inexpensive</a:t>
-                      </a:r>
-                    </a:p>
-                    <a:p>
-                      <a:pPr marL="285750" marR="0" lvl="0" indent="-285750" algn="l" defTabSz="914400" rtl="0" eaLnBrk="1" fontAlgn="auto" latinLnBrk="0" hangingPunct="1">
-                        <a:lnSpc>
-                          <a:spcPct val="100000"/>
-                        </a:lnSpc>
-                        <a:spcBef>
-                          <a:spcPts val="0"/>
-                        </a:spcBef>
-                        <a:spcAft>
-                          <a:spcPts val="0"/>
-                        </a:spcAft>
-                        <a:buClrTx/>
-                        <a:buSzTx/>
-                        <a:buFont typeface="Arial" panose="020B0604020202020204" pitchFamily="34" charset="0"/>
-                        <a:buChar char="•"/>
-                        <a:tabLst/>
-                        <a:defRPr/>
-                      </a:pPr>
-                      <a:r>
-                        <a:rPr lang="en-US" dirty="0"/>
-                        <a:t>Allows switching electrical loads beyond the rating of an Arduino alone. </a:t>
-                      </a:r>
-                    </a:p>
-                    <a:p>
-                      <a:r>
-                        <a:rPr lang="en-US" b="1" dirty="0"/>
-                        <a:t>Cons:</a:t>
-                      </a:r>
-                    </a:p>
-                    <a:p>
-                      <a:pPr marL="285750" indent="-285750">
-                        <a:buFont typeface="Arial" panose="020B0604020202020204" pitchFamily="34" charset="0"/>
-                        <a:buChar char="•"/>
-                      </a:pPr>
-                      <a:r>
-                        <a:rPr lang="en-US" dirty="0"/>
-                        <a:t>Modules are Physically large</a:t>
-                      </a:r>
-                    </a:p>
-                  </a:txBody>
-                  <a:tcPr/>
-                </a:tc>
-                <a:extLst>
-                  <a:ext uri="{0D108BD9-81ED-4DB2-BD59-A6C34878D82A}">
-                    <a16:rowId xmlns:a16="http://schemas.microsoft.com/office/drawing/2014/main" val="2494442280"/>
-                  </a:ext>
-                </a:extLst>
-              </a:tr>
-              <a:tr h="1525957">
-                <a:tc gridSpan="2">
-                  <a:txBody>
-                    <a:bodyPr/>
-                    <a:lstStyle/>
-                    <a:p>
-                      <a:r>
-                        <a:rPr lang="en-US" b="1" dirty="0"/>
-                        <a:t>Notes:  </a:t>
-                      </a:r>
-                      <a:r>
-                        <a:rPr lang="en-US" dirty="0"/>
-                        <a:t>Unlike a relay wear and tear is negligible. </a:t>
-                      </a:r>
-                    </a:p>
-                    <a:p>
-                      <a:r>
-                        <a:rPr lang="en-US" dirty="0"/>
-                        <a:t>The use of opto-coupling means the input circuit and the output circuit do not have anything in common. (In a normal N channel MOSFET the input circuit and the output circuit share the source pin.) </a:t>
-                      </a:r>
-                    </a:p>
-                  </a:txBody>
-                  <a:tcPr/>
-                </a:tc>
-                <a:tc hMerge="1">
-                  <a:txBody>
-                    <a:bodyPr/>
-                    <a:lstStyle/>
-                    <a:p>
-                      <a:endParaRPr lang="en-US"/>
-                    </a:p>
-                  </a:txBody>
-                  <a:tcPr/>
-                </a:tc>
-                <a:tc>
-                  <a:txBody>
-                    <a:bodyPr/>
-                    <a:lstStyle/>
-                    <a:p>
-                      <a:pPr marL="0" marR="0" lvl="0" indent="0" algn="l" defTabSz="914400" rtl="0" eaLnBrk="1" fontAlgn="auto" latinLnBrk="0" hangingPunct="1">
-                        <a:lnSpc>
-                          <a:spcPct val="100000"/>
-                        </a:lnSpc>
-                        <a:spcBef>
-                          <a:spcPts val="0"/>
-                        </a:spcBef>
-                        <a:spcAft>
-                          <a:spcPts val="0"/>
-                        </a:spcAft>
-                        <a:buClrTx/>
-                        <a:buSzTx/>
-                        <a:buFontTx/>
-                        <a:buNone/>
-                        <a:tabLst/>
-                        <a:defRPr/>
-                      </a:pPr>
-                      <a:endParaRPr lang="en-US" dirty="0"/>
-                    </a:p>
-                  </a:txBody>
-                  <a:tcPr/>
-                </a:tc>
-                <a:extLst>
-                  <a:ext uri="{0D108BD9-81ED-4DB2-BD59-A6C34878D82A}">
-                    <a16:rowId xmlns:a16="http://schemas.microsoft.com/office/drawing/2014/main" val="1235703702"/>
-                  </a:ext>
-                </a:extLst>
-              </a:tr>
-            </a:tbl>
-          </a:graphicData>
-        </a:graphic>
-      </p:graphicFrame>
-      <p:sp>
-        <p:nvSpPr>
-          <p:cNvPr id="5" name="Subtitle 2">
-            <a:extLst>
-              <a:ext uri="{FF2B5EF4-FFF2-40B4-BE49-F238E27FC236}">
-                <a16:creationId xmlns:a16="http://schemas.microsoft.com/office/drawing/2014/main" id="{F81EB58B-60AE-9C27-0E97-2EB666C2CC13}"/>
-              </a:ext>
-            </a:extLst>
-          </p:cNvPr>
-          <p:cNvSpPr txBox="1">
-            <a:spLocks/>
-          </p:cNvSpPr>
-          <p:nvPr/>
-        </p:nvSpPr>
-        <p:spPr>
-          <a:xfrm>
-            <a:off x="560718" y="6177560"/>
-            <a:ext cx="1357223" cy="558771"/>
-          </a:xfrm>
-          <a:prstGeom prst="rect">
-            <a:avLst/>
-          </a:prstGeom>
-        </p:spPr>
-        <p:txBody>
-          <a:bodyPr vert="horz" lIns="91440" tIns="45720" rIns="91440" bIns="45720" rtlCol="0">
-            <a:noAutofit/>
-          </a:bodyPr>
-          <a:lstStyle>
-            <a:lvl1pPr marL="0" indent="0" algn="ctr" defTabSz="914400" rtl="0" eaLnBrk="1" latinLnBrk="0" hangingPunct="1">
-              <a:lnSpc>
-                <a:spcPct val="90000"/>
-              </a:lnSpc>
-              <a:spcBef>
-                <a:spcPts val="1000"/>
-              </a:spcBef>
-              <a:buFont typeface="Arial" panose="020B0604020202020204" pitchFamily="34" charset="0"/>
-              <a:buNone/>
-              <a:defRPr sz="2400" kern="1200">
-                <a:solidFill>
-                  <a:schemeClr val="tx1"/>
-                </a:solidFill>
-                <a:latin typeface="+mn-lt"/>
-                <a:ea typeface="+mn-ea"/>
-                <a:cs typeface="+mn-cs"/>
-              </a:defRPr>
-            </a:lvl1pPr>
-            <a:lvl2pPr marL="457200" indent="0" algn="ctr" defTabSz="914400" rtl="0" eaLnBrk="1" latinLnBrk="0" hangingPunct="1">
-              <a:lnSpc>
-                <a:spcPct val="90000"/>
-              </a:lnSpc>
-              <a:spcBef>
-                <a:spcPts val="500"/>
-              </a:spcBef>
-              <a:buFont typeface="Arial" panose="020B0604020202020204" pitchFamily="34" charset="0"/>
-              <a:buNone/>
-              <a:defRPr sz="2000" kern="1200">
-                <a:solidFill>
-                  <a:schemeClr val="tx1"/>
-                </a:solidFill>
-                <a:latin typeface="+mn-lt"/>
-                <a:ea typeface="+mn-ea"/>
-                <a:cs typeface="+mn-cs"/>
-              </a:defRPr>
-            </a:lvl2pPr>
-            <a:lvl3pPr marL="914400" indent="0" algn="ctr" defTabSz="914400" rtl="0" eaLnBrk="1" latinLnBrk="0" hangingPunct="1">
-              <a:lnSpc>
-                <a:spcPct val="90000"/>
-              </a:lnSpc>
-              <a:spcBef>
-                <a:spcPts val="500"/>
-              </a:spcBef>
-              <a:buFont typeface="Arial" panose="020B0604020202020204" pitchFamily="34" charset="0"/>
-              <a:buNone/>
-              <a:defRPr sz="1800" kern="1200">
-                <a:solidFill>
-                  <a:schemeClr val="tx1"/>
-                </a:solidFill>
-                <a:latin typeface="+mn-lt"/>
-                <a:ea typeface="+mn-ea"/>
-                <a:cs typeface="+mn-cs"/>
-              </a:defRPr>
-            </a:lvl3pPr>
-            <a:lvl4pPr marL="1371600" indent="0" algn="ctr" defTabSz="914400" rtl="0" eaLnBrk="1" latinLnBrk="0" hangingPunct="1">
-              <a:lnSpc>
-                <a:spcPct val="90000"/>
-              </a:lnSpc>
-              <a:spcBef>
-                <a:spcPts val="500"/>
-              </a:spcBef>
-              <a:buFont typeface="Arial" panose="020B0604020202020204" pitchFamily="34" charset="0"/>
-              <a:buNone/>
-              <a:defRPr sz="1600" kern="1200">
-                <a:solidFill>
-                  <a:schemeClr val="tx1"/>
-                </a:solidFill>
-                <a:latin typeface="+mn-lt"/>
-                <a:ea typeface="+mn-ea"/>
-                <a:cs typeface="+mn-cs"/>
-              </a:defRPr>
-            </a:lvl4pPr>
-            <a:lvl5pPr marL="1828800" indent="0" algn="ctr" defTabSz="914400" rtl="0" eaLnBrk="1" latinLnBrk="0" hangingPunct="1">
-              <a:lnSpc>
-                <a:spcPct val="90000"/>
-              </a:lnSpc>
-              <a:spcBef>
-                <a:spcPts val="500"/>
-              </a:spcBef>
-              <a:buFont typeface="Arial" panose="020B0604020202020204" pitchFamily="34" charset="0"/>
-              <a:buNone/>
-              <a:defRPr sz="1600" kern="1200">
-                <a:solidFill>
-                  <a:schemeClr val="tx1"/>
-                </a:solidFill>
-                <a:latin typeface="+mn-lt"/>
-                <a:ea typeface="+mn-ea"/>
-                <a:cs typeface="+mn-cs"/>
-              </a:defRPr>
-            </a:lvl5pPr>
-            <a:lvl6pPr marL="2286000" indent="0" algn="ctr" defTabSz="914400" rtl="0" eaLnBrk="1" latinLnBrk="0" hangingPunct="1">
-              <a:lnSpc>
-                <a:spcPct val="90000"/>
-              </a:lnSpc>
-              <a:spcBef>
-                <a:spcPts val="500"/>
-              </a:spcBef>
-              <a:buFont typeface="Arial" panose="020B0604020202020204" pitchFamily="34" charset="0"/>
-              <a:buNone/>
-              <a:defRPr sz="1600" kern="1200">
-                <a:solidFill>
-                  <a:schemeClr val="tx1"/>
-                </a:solidFill>
-                <a:latin typeface="+mn-lt"/>
-                <a:ea typeface="+mn-ea"/>
-                <a:cs typeface="+mn-cs"/>
-              </a:defRPr>
-            </a:lvl6pPr>
-            <a:lvl7pPr marL="2743200" indent="0" algn="ctr" defTabSz="914400" rtl="0" eaLnBrk="1" latinLnBrk="0" hangingPunct="1">
-              <a:lnSpc>
-                <a:spcPct val="90000"/>
-              </a:lnSpc>
-              <a:spcBef>
-                <a:spcPts val="500"/>
-              </a:spcBef>
-              <a:buFont typeface="Arial" panose="020B0604020202020204" pitchFamily="34" charset="0"/>
-              <a:buNone/>
-              <a:defRPr sz="1600" kern="1200">
-                <a:solidFill>
-                  <a:schemeClr val="tx1"/>
-                </a:solidFill>
-                <a:latin typeface="+mn-lt"/>
-                <a:ea typeface="+mn-ea"/>
-                <a:cs typeface="+mn-cs"/>
-              </a:defRPr>
-            </a:lvl7pPr>
-            <a:lvl8pPr marL="3200400" indent="0" algn="ctr" defTabSz="914400" rtl="0" eaLnBrk="1" latinLnBrk="0" hangingPunct="1">
-              <a:lnSpc>
-                <a:spcPct val="90000"/>
-              </a:lnSpc>
-              <a:spcBef>
-                <a:spcPts val="500"/>
-              </a:spcBef>
-              <a:buFont typeface="Arial" panose="020B0604020202020204" pitchFamily="34" charset="0"/>
-              <a:buNone/>
-              <a:defRPr sz="1600" kern="1200">
-                <a:solidFill>
-                  <a:schemeClr val="tx1"/>
-                </a:solidFill>
-                <a:latin typeface="+mn-lt"/>
-                <a:ea typeface="+mn-ea"/>
-                <a:cs typeface="+mn-cs"/>
-              </a:defRPr>
-            </a:lvl8pPr>
-            <a:lvl9pPr marL="3657600" indent="0" algn="ctr" defTabSz="914400" rtl="0" eaLnBrk="1" latinLnBrk="0" hangingPunct="1">
-              <a:lnSpc>
-                <a:spcPct val="90000"/>
-              </a:lnSpc>
-              <a:spcBef>
-                <a:spcPts val="500"/>
-              </a:spcBef>
-              <a:buFont typeface="Arial" panose="020B0604020202020204" pitchFamily="34" charset="0"/>
-              <a:buNone/>
-              <a:defRPr sz="1600" kern="1200">
-                <a:solidFill>
-                  <a:schemeClr val="tx1"/>
-                </a:solidFill>
-                <a:latin typeface="+mn-lt"/>
-                <a:ea typeface="+mn-ea"/>
-                <a:cs typeface="+mn-cs"/>
-              </a:defRPr>
-            </a:lvl9pPr>
-          </a:lstStyle>
-          <a:p>
-            <a:endParaRPr lang="en-US" sz="3200" b="1" dirty="0">
-              <a:solidFill>
-                <a:schemeClr val="accent1">
-                  <a:lumMod val="60000"/>
-                  <a:lumOff val="40000"/>
-                </a:schemeClr>
-              </a:solidFill>
-              <a:latin typeface="MERG_Logo" pitchFamily="2" charset="0"/>
-            </a:endParaRPr>
-          </a:p>
-        </p:txBody>
-      </p:sp>
-      <p:pic>
-        <p:nvPicPr>
-          <p:cNvPr id="6" name="Picture 5">
-            <a:extLst>
-              <a:ext uri="{FF2B5EF4-FFF2-40B4-BE49-F238E27FC236}">
-                <a16:creationId xmlns:a16="http://schemas.microsoft.com/office/drawing/2014/main" id="{F56229F6-7040-FEA1-9A6F-B1C968B23931}"/>
-              </a:ext>
-            </a:extLst>
-          </p:cNvPr>
-          <p:cNvPicPr>
-            <a:picLocks noChangeAspect="1"/>
-          </p:cNvPicPr>
-          <p:nvPr/>
-        </p:nvPicPr>
-        <p:blipFill>
-          <a:blip r:embed="rId3" cstate="email">
-            <a:extLst>
-              <a:ext uri="{28A0092B-C50C-407E-A947-70E740481C1C}">
-                <a14:useLocalDpi xmlns:a14="http://schemas.microsoft.com/office/drawing/2010/main"/>
-              </a:ext>
-            </a:extLst>
-          </a:blip>
-          <a:stretch>
-            <a:fillRect/>
-          </a:stretch>
-        </p:blipFill>
-        <p:spPr>
-          <a:xfrm>
-            <a:off x="10749400" y="6239363"/>
-            <a:ext cx="1116784" cy="496968"/>
-          </a:xfrm>
-          <a:prstGeom prst="rect">
-            <a:avLst/>
-          </a:prstGeom>
-        </p:spPr>
-      </p:pic>
-      <p:pic>
-        <p:nvPicPr>
-          <p:cNvPr id="14" name="Picture 13">
-            <a:extLst>
-              <a:ext uri="{FF2B5EF4-FFF2-40B4-BE49-F238E27FC236}">
-                <a16:creationId xmlns:a16="http://schemas.microsoft.com/office/drawing/2014/main" id="{74DBF724-8141-5BAE-12EF-E9BBD62CC3F3}"/>
-              </a:ext>
-            </a:extLst>
-          </p:cNvPr>
-          <p:cNvPicPr>
-            <a:picLocks noChangeAspect="1"/>
-          </p:cNvPicPr>
-          <p:nvPr/>
-        </p:nvPicPr>
-        <p:blipFill>
-          <a:blip r:embed="rId4"/>
-          <a:stretch>
-            <a:fillRect/>
-          </a:stretch>
-        </p:blipFill>
-        <p:spPr>
-          <a:xfrm>
-            <a:off x="9349076" y="1343935"/>
-            <a:ext cx="2283817" cy="1338975"/>
-          </a:xfrm>
-          <a:prstGeom prst="rect">
-            <a:avLst/>
-          </a:prstGeom>
-        </p:spPr>
-      </p:pic>
-      <p:pic>
-        <p:nvPicPr>
-          <p:cNvPr id="3" name="Picture 2">
-            <a:extLst>
-              <a:ext uri="{FF2B5EF4-FFF2-40B4-BE49-F238E27FC236}">
-                <a16:creationId xmlns:a16="http://schemas.microsoft.com/office/drawing/2014/main" id="{69655178-F38E-18D3-5F86-3B41C4651E47}"/>
-              </a:ext>
-            </a:extLst>
-          </p:cNvPr>
-          <p:cNvPicPr>
-            <a:picLocks noChangeAspect="1"/>
-          </p:cNvPicPr>
-          <p:nvPr/>
-        </p:nvPicPr>
-        <p:blipFill>
-          <a:blip r:embed="rId5"/>
-          <a:stretch>
-            <a:fillRect/>
-          </a:stretch>
-        </p:blipFill>
-        <p:spPr>
-          <a:xfrm>
-            <a:off x="8062378" y="4500456"/>
-            <a:ext cx="3570515" cy="1478629"/>
-          </a:xfrm>
-          <a:prstGeom prst="rect">
-            <a:avLst/>
-          </a:prstGeom>
-        </p:spPr>
-      </p:pic>
-      <p:pic>
-        <p:nvPicPr>
-          <p:cNvPr id="8" name="Picture 7">
-            <a:extLst>
-              <a:ext uri="{FF2B5EF4-FFF2-40B4-BE49-F238E27FC236}">
-                <a16:creationId xmlns:a16="http://schemas.microsoft.com/office/drawing/2014/main" id="{79F775C9-9893-4C78-AA68-339CADA73E1D}"/>
-              </a:ext>
-            </a:extLst>
-          </p:cNvPr>
-          <p:cNvPicPr>
-            <a:picLocks noChangeAspect="1"/>
-          </p:cNvPicPr>
-          <p:nvPr/>
-        </p:nvPicPr>
-        <p:blipFill>
-          <a:blip r:embed="rId6"/>
-          <a:stretch>
-            <a:fillRect/>
-          </a:stretch>
-        </p:blipFill>
-        <p:spPr>
-          <a:xfrm>
-            <a:off x="6096000" y="4678516"/>
-            <a:ext cx="1903555" cy="1189722"/>
+            <a:off x="8449967" y="1407539"/>
+            <a:ext cx="2298312" cy="1212633"/>
           </a:xfrm>
           <a:prstGeom prst="rect">
             <a:avLst/>

</xml_diff>